<commit_message>
all sorts of additions to nubia
</commit_message>
<xml_diff>
--- a/documentation/nubia.pptx
+++ b/documentation/nubia.pptx
@@ -5028,7 +5028,7 @@
         </p:nvSpPr>
         <p:spPr bwMode="auto">
           <a:xfrm flipH="0" flipV="0">
-            <a:off x="7200562" y="1924049"/>
+            <a:off x="7200562" y="4724397"/>
             <a:ext cx="1800000" cy="1219199"/>
           </a:xfrm>
           <a:prstGeom prst="rect">
@@ -5073,7 +5073,7 @@
         </p:nvSpPr>
         <p:spPr bwMode="auto">
           <a:xfrm flipH="0" flipV="0">
-            <a:off x="7200562" y="5410199"/>
+            <a:off x="7200562" y="1904988"/>
             <a:ext cx="1800000" cy="1219199"/>
           </a:xfrm>
           <a:prstGeom prst="rect">
@@ -5114,15 +5114,15 @@
         <p:nvCxnSpPr>
           <p:cNvPr id="0" name=""/>
           <p:cNvCxnSpPr>
-            <a:stCxn id="356791605" idx="2"/>
-            <a:endCxn id="1371784035" idx="0"/>
+            <a:stCxn id="356791605" idx="0"/>
+            <a:endCxn id="1371784035" idx="2"/>
           </p:cNvCxnSpPr>
           <p:nvPr/>
         </p:nvCxnSpPr>
         <p:spPr bwMode="auto">
-          <a:xfrm rot="5399978" flipH="0" flipV="0">
-            <a:off x="6967087" y="4276724"/>
-            <a:ext cx="2266949" cy="0"/>
+          <a:xfrm rot="16199969" flipH="0" flipV="0">
+            <a:off x="7300457" y="3924293"/>
+            <a:ext cx="1600209" cy="0"/>
           </a:xfrm>
           <a:prstGeom prst="line">
             <a:avLst/>

</xml_diff>